<commit_message>
ajuste de mapa conceptual tema 2
</commit_message>
<xml_diff>
--- a/fuentes/contenidos/grado08/guion02/MA_08_02_CO_REC220.pptx
+++ b/fuentes/contenidos/grado08/guion02/MA_08_02_CO_REC220.pptx
@@ -450,7 +450,7 @@
           <a:p>
             <a:fld id="{5001C876-01F7-4317-94B9-1AE222133113}" type="datetimeFigureOut">
               <a:rPr lang="es-ES" smtClean="0"/>
-              <a:t>03/08/2015</a:t>
+              <a:t>10/08/2015</a:t>
             </a:fld>
             <a:endParaRPr lang="es-ES"/>
           </a:p>
@@ -1119,19 +1119,11 @@
             <a:pPr algn="ctr"/>
             <a:r>
               <a:rPr lang="es-ES" sz="1200" b="1" dirty="0" smtClean="0"/>
-              <a:t>c</a:t>
+              <a:t>Combinaciones </a:t>
             </a:r>
             <a:r>
               <a:rPr lang="es-ES" sz="1200" b="1" dirty="0" smtClean="0"/>
-              <a:t>ombinaciones </a:t>
-            </a:r>
-            <a:r>
-              <a:rPr lang="es-ES" sz="1200" b="1" dirty="0" smtClean="0"/>
-              <a:t>de números y letras unidas mediante operaciones </a:t>
-            </a:r>
-            <a:r>
-              <a:rPr lang="es-ES" sz="1200" b="1" dirty="0" smtClean="0"/>
-              <a:t>aritméticas</a:t>
+              <a:t>de números y letras unidas mediante operaciones aritméticas</a:t>
             </a:r>
             <a:endParaRPr lang="es-ES" sz="1200" b="1" dirty="0"/>
           </a:p>
@@ -1261,15 +1253,7 @@
                   <a:schemeClr val="bg1"/>
                 </a:solidFill>
               </a:rPr>
-              <a:t>arte </a:t>
-            </a:r>
-            <a:r>
-              <a:rPr lang="es-ES" sz="900" dirty="0" smtClean="0">
-                <a:solidFill>
-                  <a:schemeClr val="bg1"/>
-                </a:solidFill>
-              </a:rPr>
-              <a:t>literal</a:t>
+              <a:t>arte literal</a:t>
             </a:r>
             <a:endParaRPr lang="es-ES" sz="900" dirty="0">
               <a:solidFill>
@@ -1337,15 +1321,7 @@
                   <a:schemeClr val="tx1"/>
                 </a:solidFill>
               </a:rPr>
-              <a:t>orresponde a las </a:t>
-            </a:r>
-            <a:r>
-              <a:rPr lang="es-ES" sz="900" dirty="0" smtClean="0">
-                <a:solidFill>
-                  <a:schemeClr val="tx1"/>
-                </a:solidFill>
-              </a:rPr>
-              <a:t>letras de la expresión algebraica.</a:t>
+              <a:t>orresponde a las letras de la expresión algebraica.</a:t>
             </a:r>
             <a:endParaRPr lang="es-ES" sz="900" dirty="0">
               <a:solidFill>
@@ -1508,7 +1484,7 @@
             <a:pPr algn="ctr"/>
             <a:r>
               <a:rPr lang="es-ES" sz="1200" b="1" dirty="0" smtClean="0"/>
-              <a:t>expresar </a:t>
+              <a:t>Expresar </a:t>
             </a:r>
             <a:r>
               <a:rPr lang="es-ES" sz="1200" b="1" dirty="0" smtClean="0"/>
@@ -1752,23 +1728,7 @@
                   <a:schemeClr val="tx1"/>
                 </a:solidFill>
               </a:rPr>
-              <a:t>s </a:t>
-            </a:r>
-            <a:r>
-              <a:rPr lang="es-ES" sz="900" dirty="0" smtClean="0">
-                <a:solidFill>
-                  <a:schemeClr val="tx1"/>
-                </a:solidFill>
-              </a:rPr>
-              <a:t>el coeficiente que acompaña la parte </a:t>
-            </a:r>
-            <a:r>
-              <a:rPr lang="es-ES" sz="900" dirty="0" smtClean="0">
-                <a:solidFill>
-                  <a:schemeClr val="tx1"/>
-                </a:solidFill>
-              </a:rPr>
-              <a:t>literal</a:t>
+              <a:t>s el coeficiente que acompaña la parte literal</a:t>
             </a:r>
             <a:endParaRPr lang="es-ES" sz="900" dirty="0">
               <a:solidFill>
@@ -1916,7 +1876,7 @@
                   <a:schemeClr val="bg1"/>
                 </a:solidFill>
               </a:rPr>
-              <a:t>Expresiones </a:t>
+              <a:t>expresiones </a:t>
             </a:r>
             <a:r>
               <a:rPr lang="es-ES" sz="900" dirty="0" smtClean="0">
@@ -1959,11 +1919,7 @@
             <a:pPr algn="ctr"/>
             <a:r>
               <a:rPr lang="es-ES" sz="900" dirty="0" smtClean="0"/>
-              <a:t>se </a:t>
-            </a:r>
-            <a:r>
-              <a:rPr lang="es-ES" sz="900" dirty="0" smtClean="0"/>
-              <a:t>definen operaciones como</a:t>
+              <a:t>se definen operaciones como</a:t>
             </a:r>
             <a:endParaRPr lang="es-ES" sz="900" dirty="0"/>
           </a:p>
@@ -1993,12 +1949,16 @@
           <a:p>
             <a:pPr algn="ctr"/>
             <a:r>
+              <a:rPr lang="es-ES" sz="900" dirty="0"/>
+              <a:t>s</a:t>
+            </a:r>
+            <a:r>
               <a:rPr lang="es-ES" sz="900" dirty="0" smtClean="0"/>
-              <a:t>Se caracterizan </a:t>
+              <a:t>e </a:t>
             </a:r>
             <a:r>
               <a:rPr lang="es-ES" sz="900" dirty="0" smtClean="0"/>
-              <a:t>porque</a:t>
+              <a:t>caracterizan porque</a:t>
             </a:r>
             <a:endParaRPr lang="es-ES" sz="900" dirty="0"/>
           </a:p>
@@ -2049,12 +2009,20 @@
           <a:p>
             <a:pPr algn="ctr"/>
             <a:r>
+              <a:rPr lang="es-CO" sz="900" dirty="0">
+                <a:solidFill>
+                  <a:schemeClr val="tx1"/>
+                </a:solidFill>
+              </a:rPr>
+              <a:t>l</a:t>
+            </a:r>
+            <a:r>
               <a:rPr lang="es-CO" sz="900" dirty="0" smtClean="0">
                 <a:solidFill>
                   <a:schemeClr val="tx1"/>
                 </a:solidFill>
               </a:rPr>
-              <a:t>Los términos están separados por signos de adición </a:t>
+              <a:t>os </a:t>
             </a:r>
             <a:r>
               <a:rPr lang="es-CO" sz="900" dirty="0" smtClean="0">
@@ -2062,15 +2030,7 @@
                   <a:schemeClr val="tx1"/>
                 </a:solidFill>
               </a:rPr>
-              <a:t>o </a:t>
-            </a:r>
-            <a:r>
-              <a:rPr lang="es-CO" sz="900" dirty="0" smtClean="0">
-                <a:solidFill>
-                  <a:schemeClr val="tx1"/>
-                </a:solidFill>
-              </a:rPr>
-              <a:t>sustracción.</a:t>
+              <a:t>términos están separados por signos de adición o sustracción.</a:t>
             </a:r>
             <a:endParaRPr lang="es-ES" sz="900" dirty="0">
               <a:solidFill>
@@ -2130,15 +2090,7 @@
                   <a:schemeClr val="tx1"/>
                 </a:solidFill>
               </a:rPr>
-              <a:t>adición </a:t>
-            </a:r>
-            <a:r>
-              <a:rPr lang="es-ES" sz="900" dirty="0" smtClean="0">
-                <a:solidFill>
-                  <a:schemeClr val="tx1"/>
-                </a:solidFill>
-              </a:rPr>
-              <a:t>y sustracción</a:t>
+              <a:t>adición y sustracción</a:t>
             </a:r>
             <a:endParaRPr lang="es-ES" sz="900" dirty="0">
               <a:solidFill>
@@ -2194,7 +2146,15 @@
                   <a:schemeClr val="tx1"/>
                 </a:solidFill>
               </a:rPr>
-              <a:t>Se adicionan o sustraen los términos semejantes.</a:t>
+              <a:t>se </a:t>
+            </a:r>
+            <a:r>
+              <a:rPr lang="es-CO" sz="900" dirty="0" smtClean="0">
+                <a:solidFill>
+                  <a:schemeClr val="tx1"/>
+                </a:solidFill>
+              </a:rPr>
+              <a:t>adicionan o sustraen los términos semejantes.</a:t>
             </a:r>
             <a:endParaRPr lang="es-ES" sz="900" dirty="0">
               <a:solidFill>
@@ -2249,7 +2209,15 @@
                   <a:schemeClr val="tx1"/>
                 </a:solidFill>
               </a:rPr>
-              <a:t>Se aplica la propiedad distributiva de la multiplicación.</a:t>
+              <a:t>se </a:t>
+            </a:r>
+            <a:r>
+              <a:rPr lang="es-CO" sz="900" dirty="0" smtClean="0">
+                <a:solidFill>
+                  <a:schemeClr val="tx1"/>
+                </a:solidFill>
+              </a:rPr>
+              <a:t>aplica la propiedad distributiva de la multiplicación.</a:t>
             </a:r>
             <a:endParaRPr lang="es-ES" sz="900" dirty="0">
               <a:solidFill>
@@ -2305,15 +2273,7 @@
                   <a:schemeClr val="tx1"/>
                 </a:solidFill>
               </a:rPr>
-              <a:t>se </a:t>
-            </a:r>
-            <a:r>
-              <a:rPr lang="es-CO" sz="900" dirty="0" smtClean="0">
-                <a:solidFill>
-                  <a:schemeClr val="tx1"/>
-                </a:solidFill>
-              </a:rPr>
-              <a:t>aplica el algoritmo de la división aritmética.</a:t>
+              <a:t>se aplica el algoritmo de la división aritmética.</a:t>
             </a:r>
             <a:endParaRPr lang="es-ES" sz="900" dirty="0">
               <a:solidFill>
@@ -2369,15 +2329,7 @@
                   <a:schemeClr val="tx1"/>
                 </a:solidFill>
               </a:rPr>
-              <a:t>se </a:t>
-            </a:r>
-            <a:r>
-              <a:rPr lang="es-CO" sz="900" dirty="0" smtClean="0">
-                <a:solidFill>
-                  <a:schemeClr val="tx1"/>
-                </a:solidFill>
-              </a:rPr>
-              <a:t>aplica la división sintética.</a:t>
+              <a:t>se aplica la división sintética.</a:t>
             </a:r>
             <a:endParaRPr lang="es-ES" sz="900" dirty="0">
               <a:solidFill>
@@ -2433,15 +2385,7 @@
                   <a:schemeClr val="tx1"/>
                 </a:solidFill>
               </a:rPr>
-              <a:t>se </a:t>
-            </a:r>
-            <a:r>
-              <a:rPr lang="es-CO" sz="900" dirty="0" smtClean="0">
-                <a:solidFill>
-                  <a:schemeClr val="tx1"/>
-                </a:solidFill>
-              </a:rPr>
-              <a:t>utiliza el teorema del residuo para hallar el resto de una división.</a:t>
+              <a:t>se utiliza el teorema del residuo para hallar el resto de una división.</a:t>
             </a:r>
             <a:endParaRPr lang="es-ES" sz="900" dirty="0">
               <a:solidFill>
@@ -2678,7 +2622,7 @@
                   <a:schemeClr val="bg1"/>
                 </a:solidFill>
               </a:rPr>
-              <a:t>Expresiones </a:t>
+              <a:t>expresiones </a:t>
             </a:r>
             <a:r>
               <a:rPr lang="es-ES" sz="900" dirty="0" smtClean="0">
@@ -2834,7 +2778,7 @@
                   <a:schemeClr val="bg1"/>
                 </a:solidFill>
               </a:rPr>
-              <a:t>Expresiones </a:t>
+              <a:t>expresiones </a:t>
             </a:r>
             <a:r>
               <a:rPr lang="es-ES" sz="900" dirty="0" smtClean="0">
@@ -2902,7 +2846,15 @@
                   <a:schemeClr val="tx1"/>
                 </a:solidFill>
               </a:rPr>
-              <a:t>Términos semejantes</a:t>
+              <a:t>términos </a:t>
+            </a:r>
+            <a:r>
+              <a:rPr lang="es-ES" sz="900" dirty="0" smtClean="0">
+                <a:solidFill>
+                  <a:schemeClr val="tx1"/>
+                </a:solidFill>
+              </a:rPr>
+              <a:t>semejantes</a:t>
             </a:r>
             <a:endParaRPr lang="es-ES" sz="900" dirty="0">
               <a:solidFill>
@@ -2989,13 +2941,18 @@
           <a:p>
             <a:pPr algn="ctr"/>
             <a:r>
-              <a:rPr lang="es-ES" sz="900" dirty="0">
+              <a:rPr lang="es-ES" sz="900" dirty="0" smtClean="0">
                 <a:solidFill>
                   <a:schemeClr val="tx1"/>
                 </a:solidFill>
               </a:rPr>
-              <a:t>Opuestos</a:t>
-            </a:r>
+              <a:t>opuestos</a:t>
+            </a:r>
+            <a:endParaRPr lang="es-ES" sz="900" dirty="0">
+              <a:solidFill>
+                <a:schemeClr val="tx1"/>
+              </a:solidFill>
+            </a:endParaRPr>
           </a:p>
           <a:p>
             <a:pPr algn="ctr"/>
@@ -3048,11 +3005,7 @@
             <a:pPr algn="ctr"/>
             <a:r>
               <a:rPr lang="es-ES" sz="900" dirty="0" smtClean="0"/>
-              <a:t>Se </a:t>
-            </a:r>
-            <a:r>
-              <a:rPr lang="es-ES" sz="900" dirty="0" smtClean="0"/>
-              <a:t>identifican</a:t>
+              <a:t>Se identifican</a:t>
             </a:r>
             <a:endParaRPr lang="es-ES" sz="900" dirty="0"/>
           </a:p>
@@ -3990,14 +3943,12 @@
       <p:cxnSp>
         <p:nvCxnSpPr>
           <p:cNvPr id="313" name="Conector angular 312"/>
-          <p:cNvCxnSpPr>
-            <a:endCxn id="277" idx="0"/>
-          </p:cNvCxnSpPr>
+          <p:cNvCxnSpPr/>
           <p:nvPr/>
         </p:nvCxnSpPr>
         <p:spPr>
           <a:xfrm>
-            <a:off x="5787577" y="3091975"/>
+            <a:off x="5674137" y="3068481"/>
             <a:ext cx="1400466" cy="179501"/>
           </a:xfrm>
           <a:prstGeom prst="bentConnector2">
@@ -4027,7 +3978,7 @@
         </p:nvCxnSpPr>
         <p:spPr>
           <a:xfrm>
-            <a:off x="5272786" y="2842540"/>
+            <a:off x="5121281" y="2835572"/>
             <a:ext cx="552856" cy="239330"/>
           </a:xfrm>
           <a:prstGeom prst="bentConnector3">

</xml_diff>

<commit_message>
Cambios en mapa conceptual tema 2
Quito puntos finales en mapa conceptual del tema 2 de grado 8 y borro
archivos que ya no son necesarios de la carpeta.
</commit_message>
<xml_diff>
--- a/fuentes/contenidos/grado08/guion02/MA_08_02_CO_REC220.pptx
+++ b/fuentes/contenidos/grado08/guion02/MA_08_02_CO_REC220.pptx
@@ -450,7 +450,7 @@
           <a:p>
             <a:fld id="{5001C876-01F7-4317-94B9-1AE222133113}" type="datetimeFigureOut">
               <a:rPr lang="es-ES" smtClean="0"/>
-              <a:t>19/10/2015</a:t>
+              <a:t>25/11/2015</a:t>
             </a:fld>
             <a:endParaRPr lang="es-ES"/>
           </a:p>
@@ -1076,7 +1076,7 @@
         </p:nvSpPr>
         <p:spPr>
           <a:xfrm>
-            <a:off x="370649" y="999299"/>
+            <a:off x="869942" y="1058407"/>
             <a:ext cx="1733897" cy="721989"/>
           </a:xfrm>
           <a:prstGeom prst="rect">
@@ -1133,7 +1133,7 @@
         </p:nvCxnSpPr>
         <p:spPr>
           <a:xfrm rot="5400000">
-            <a:off x="2919776" y="-1104736"/>
+            <a:off x="3258713" y="-1104833"/>
             <a:ext cx="244755" cy="3373726"/>
           </a:xfrm>
           <a:prstGeom prst="bentConnector3">
@@ -1168,7 +1168,7 @@
         </p:nvSpPr>
         <p:spPr>
           <a:xfrm>
-            <a:off x="794074" y="2006503"/>
+            <a:off x="1188944" y="2005532"/>
             <a:ext cx="1122431" cy="230832"/>
           </a:xfrm>
           <a:prstGeom prst="rect">
@@ -1199,7 +1199,7 @@
         </p:nvSpPr>
         <p:spPr>
           <a:xfrm>
-            <a:off x="451917" y="2551673"/>
+            <a:off x="451917" y="2801380"/>
             <a:ext cx="675247" cy="461474"/>
           </a:xfrm>
           <a:prstGeom prst="rect">
@@ -1267,7 +1267,7 @@
         </p:nvSpPr>
         <p:spPr>
           <a:xfrm>
-            <a:off x="454110" y="3427460"/>
+            <a:off x="454110" y="3677167"/>
             <a:ext cx="835702" cy="832144"/>
           </a:xfrm>
           <a:prstGeom prst="rect">
@@ -1317,7 +1317,7 @@
                   <a:schemeClr val="tx1"/>
                 </a:solidFill>
               </a:rPr>
-              <a:t>orresponde a las letras de la expresión algebraica.</a:t>
+              <a:t>orresponde a las letras de la expresión algebraica</a:t>
             </a:r>
             <a:endParaRPr lang="es-ES" sz="900" dirty="0">
               <a:solidFill>
@@ -1335,7 +1335,7 @@
         </p:nvSpPr>
         <p:spPr>
           <a:xfrm>
-            <a:off x="816655" y="675891"/>
+            <a:off x="1171647" y="720500"/>
             <a:ext cx="1122431" cy="230832"/>
           </a:xfrm>
           <a:prstGeom prst="rect">
@@ -1368,9 +1368,9 @@
           <p:nvPr/>
         </p:nvCxnSpPr>
         <p:spPr>
-          <a:xfrm rot="5400000">
-            <a:off x="1261447" y="882875"/>
-            <a:ext cx="92576" cy="140273"/>
+          <a:xfrm rot="16200000" flipH="1">
+            <a:off x="1681340" y="1002855"/>
+            <a:ext cx="107075" cy="4028"/>
           </a:xfrm>
           <a:prstGeom prst="bentConnector3">
             <a:avLst>
@@ -1427,11 +1427,7 @@
             </a:r>
             <a:r>
               <a:rPr lang="es-ES" sz="900" dirty="0" smtClean="0"/>
-              <a:t>e </a:t>
-            </a:r>
-            <a:r>
-              <a:rPr lang="es-ES" sz="900" dirty="0" smtClean="0"/>
-              <a:t>clasifican en</a:t>
+              <a:t>e clasifican en</a:t>
             </a:r>
             <a:endParaRPr lang="es-ES" sz="900" dirty="0"/>
           </a:p>
@@ -1560,11 +1556,7 @@
             </a:r>
             <a:r>
               <a:rPr lang="es-ES" sz="900" dirty="0" smtClean="0"/>
-              <a:t>irven </a:t>
-            </a:r>
-            <a:r>
-              <a:rPr lang="es-ES" sz="900" dirty="0" smtClean="0"/>
-              <a:t>para</a:t>
+              <a:t>irven para</a:t>
             </a:r>
             <a:endParaRPr lang="es-ES" sz="900" dirty="0"/>
           </a:p>
@@ -1618,7 +1610,7 @@
         </p:nvSpPr>
         <p:spPr>
           <a:xfrm>
-            <a:off x="1307735" y="2541269"/>
+            <a:off x="1307735" y="2790976"/>
             <a:ext cx="757138" cy="550390"/>
           </a:xfrm>
           <a:prstGeom prst="rect">
@@ -1686,7 +1678,7 @@
         </p:nvSpPr>
         <p:spPr>
           <a:xfrm>
-            <a:off x="1441482" y="3395593"/>
+            <a:off x="1441482" y="3645300"/>
             <a:ext cx="835702" cy="864011"/>
           </a:xfrm>
           <a:prstGeom prst="rect">
@@ -2018,7 +2010,7 @@
                   <a:schemeClr val="tx1"/>
                 </a:solidFill>
               </a:rPr>
-              <a:t>os términos están separados por signos de adición o sustracción.</a:t>
+              <a:t>os términos están separados por signos de adición o sustracción</a:t>
             </a:r>
             <a:endParaRPr lang="es-ES" sz="900" dirty="0">
               <a:solidFill>
@@ -2134,7 +2126,7 @@
                   <a:schemeClr val="tx1"/>
                 </a:solidFill>
               </a:rPr>
-              <a:t>se adicionan o sustraen los términos semejantes.</a:t>
+              <a:t>se adicionan o sustraen los términos semejantes</a:t>
             </a:r>
             <a:endParaRPr lang="es-ES" sz="900" dirty="0">
               <a:solidFill>
@@ -2189,7 +2181,7 @@
                   <a:schemeClr val="tx1"/>
                 </a:solidFill>
               </a:rPr>
-              <a:t>se aplica la propiedad distributiva de la multiplicación.</a:t>
+              <a:t>se aplica la propiedad distributiva de la multiplicación</a:t>
             </a:r>
             <a:endParaRPr lang="es-ES" sz="900" dirty="0">
               <a:solidFill>
@@ -2245,7 +2237,7 @@
                   <a:schemeClr val="tx1"/>
                 </a:solidFill>
               </a:rPr>
-              <a:t>se aplica el algoritmo de la división aritmética.</a:t>
+              <a:t>se aplica el algoritmo de la división aritmética</a:t>
             </a:r>
             <a:endParaRPr lang="es-ES" sz="900" dirty="0">
               <a:solidFill>
@@ -2301,7 +2293,7 @@
                   <a:schemeClr val="tx1"/>
                 </a:solidFill>
               </a:rPr>
-              <a:t>se aplica la división sintética.</a:t>
+              <a:t>se aplica la división sintética</a:t>
             </a:r>
             <a:endParaRPr lang="es-ES" sz="900" dirty="0">
               <a:solidFill>
@@ -2357,7 +2349,7 @@
                   <a:schemeClr val="tx1"/>
                 </a:solidFill>
               </a:rPr>
-              <a:t>se utiliza el teorema del residuo para hallar el resto de una división.</a:t>
+              <a:t>se utiliza el teorema del residuo para hallar el resto de una división</a:t>
             </a:r>
             <a:endParaRPr lang="es-ES" sz="900" dirty="0">
               <a:solidFill>
@@ -2375,7 +2367,7 @@
         </p:nvSpPr>
         <p:spPr>
           <a:xfrm>
-            <a:off x="2245444" y="2551673"/>
+            <a:off x="2245444" y="2801380"/>
             <a:ext cx="600252" cy="193910"/>
           </a:xfrm>
           <a:prstGeom prst="rect">
@@ -2435,7 +2427,7 @@
         </p:nvSpPr>
         <p:spPr>
           <a:xfrm>
-            <a:off x="2428854" y="3395593"/>
+            <a:off x="2428854" y="3645300"/>
             <a:ext cx="835702" cy="864011"/>
           </a:xfrm>
           <a:prstGeom prst="rect">
@@ -3253,7 +3245,7 @@
         </p:nvCxnSpPr>
         <p:spPr>
           <a:xfrm>
-            <a:off x="789540" y="2280710"/>
+            <a:off x="789540" y="2530417"/>
             <a:ext cx="1882578" cy="0"/>
           </a:xfrm>
           <a:prstGeom prst="line">
@@ -3283,7 +3275,7 @@
         </p:nvCxnSpPr>
         <p:spPr>
           <a:xfrm>
-            <a:off x="771794" y="2280710"/>
+            <a:off x="771794" y="2530417"/>
             <a:ext cx="9525" cy="270963"/>
           </a:xfrm>
           <a:prstGeom prst="line">
@@ -3313,7 +3305,7 @@
         </p:nvCxnSpPr>
         <p:spPr>
           <a:xfrm flipH="1">
-            <a:off x="1688685" y="2280710"/>
+            <a:off x="1688685" y="2530417"/>
             <a:ext cx="11084" cy="260559"/>
           </a:xfrm>
           <a:prstGeom prst="line">
@@ -3343,7 +3335,7 @@
         </p:nvCxnSpPr>
         <p:spPr>
           <a:xfrm flipH="1">
-            <a:off x="2659685" y="2270306"/>
+            <a:off x="2659685" y="2520013"/>
             <a:ext cx="12433" cy="270963"/>
           </a:xfrm>
           <a:prstGeom prst="line">
@@ -3373,7 +3365,7 @@
         </p:nvCxnSpPr>
         <p:spPr>
           <a:xfrm>
-            <a:off x="1705735" y="3105835"/>
+            <a:off x="1705735" y="3355542"/>
             <a:ext cx="4763" cy="275581"/>
           </a:xfrm>
           <a:prstGeom prst="line">
@@ -3403,7 +3395,7 @@
         </p:nvCxnSpPr>
         <p:spPr>
           <a:xfrm flipH="1">
-            <a:off x="816654" y="3013147"/>
+            <a:off x="816654" y="3262854"/>
             <a:ext cx="1" cy="414313"/>
           </a:xfrm>
           <a:prstGeom prst="line">
@@ -3433,7 +3425,7 @@
         </p:nvCxnSpPr>
         <p:spPr>
           <a:xfrm flipH="1">
-            <a:off x="2628900" y="2775385"/>
+            <a:off x="2628900" y="3025092"/>
             <a:ext cx="16188" cy="625040"/>
           </a:xfrm>
           <a:prstGeom prst="line">
@@ -4299,6 +4291,71 @@
           <a:xfrm>
             <a:off x="7208637" y="5310228"/>
             <a:ext cx="0" cy="235370"/>
+          </a:xfrm>
+          <a:prstGeom prst="line">
+            <a:avLst/>
+          </a:prstGeom>
+        </p:spPr>
+        <p:style>
+          <a:lnRef idx="1">
+            <a:schemeClr val="dk1"/>
+          </a:lnRef>
+          <a:fillRef idx="0">
+            <a:schemeClr val="dk1"/>
+          </a:fillRef>
+          <a:effectRef idx="0">
+            <a:schemeClr val="dk1"/>
+          </a:effectRef>
+          <a:fontRef idx="minor">
+            <a:schemeClr val="tx1"/>
+          </a:fontRef>
+        </p:style>
+      </p:cxnSp>
+      <p:cxnSp>
+        <p:nvCxnSpPr>
+          <p:cNvPr id="79" name="Conector recto 78"/>
+          <p:cNvCxnSpPr>
+            <a:stCxn id="5" idx="2"/>
+            <a:endCxn id="19" idx="0"/>
+          </p:cNvCxnSpPr>
+          <p:nvPr/>
+        </p:nvCxnSpPr>
+        <p:spPr>
+          <a:xfrm>
+            <a:off x="1736891" y="1780396"/>
+            <a:ext cx="13269" cy="225136"/>
+          </a:xfrm>
+          <a:prstGeom prst="line">
+            <a:avLst/>
+          </a:prstGeom>
+        </p:spPr>
+        <p:style>
+          <a:lnRef idx="1">
+            <a:schemeClr val="dk1"/>
+          </a:lnRef>
+          <a:fillRef idx="0">
+            <a:schemeClr val="dk1"/>
+          </a:fillRef>
+          <a:effectRef idx="0">
+            <a:schemeClr val="dk1"/>
+          </a:effectRef>
+          <a:fontRef idx="minor">
+            <a:schemeClr val="tx1"/>
+          </a:fontRef>
+        </p:style>
+      </p:cxnSp>
+      <p:cxnSp>
+        <p:nvCxnSpPr>
+          <p:cNvPr id="80" name="Conector recto 79"/>
+          <p:cNvCxnSpPr>
+            <a:stCxn id="19" idx="2"/>
+          </p:cNvCxnSpPr>
+          <p:nvPr/>
+        </p:nvCxnSpPr>
+        <p:spPr>
+          <a:xfrm>
+            <a:off x="1750160" y="2236364"/>
+            <a:ext cx="0" cy="302925"/>
           </a:xfrm>
           <a:prstGeom prst="line">
             <a:avLst/>

</xml_diff>

<commit_message>
Revisión tema 2 grado 8
Se realizan cambios en el orden de los recursos del tema 2 de grado 8,
se actualiza escaleta y cuaderno de estudio.
Se anexa archivo con observaciones.
</commit_message>
<xml_diff>
--- a/fuentes/contenidos/grado08/guion02/MA_08_02_CO_REC220.pptx
+++ b/fuentes/contenidos/grado08/guion02/MA_08_02_CO_REC220.pptx
@@ -450,7 +450,7 @@
           <a:p>
             <a:fld id="{5001C876-01F7-4317-94B9-1AE222133113}" type="datetimeFigureOut">
               <a:rPr lang="es-ES" smtClean="0"/>
-              <a:t>25/11/2015</a:t>
+              <a:t>03/12/2015</a:t>
             </a:fld>
             <a:endParaRPr lang="es-ES"/>
           </a:p>
@@ -654,7 +654,11 @@
           <a:p>
             <a:r>
               <a:rPr lang="es-ES" sz="1200" dirty="0" smtClean="0"/>
-              <a:t>© Editorial Planeta Colombiana S.A., 2015.</a:t>
+              <a:t>© Editorial Planeta Colombiana S.A., </a:t>
+            </a:r>
+            <a:r>
+              <a:rPr lang="es-ES" sz="1200" dirty="0" smtClean="0"/>
+              <a:t>2016.</a:t>
             </a:r>
             <a:endParaRPr lang="es-ES" sz="1200" dirty="0"/>
           </a:p>
@@ -1128,16 +1132,21 @@
       <p:cxnSp>
         <p:nvCxnSpPr>
           <p:cNvPr id="12" name="Conector angular 11"/>
-          <p:cNvCxnSpPr/>
+          <p:cNvCxnSpPr>
+            <a:stCxn id="4" idx="2"/>
+            <a:endCxn id="130" idx="0"/>
+          </p:cNvCxnSpPr>
           <p:nvPr/>
         </p:nvCxnSpPr>
         <p:spPr>
           <a:xfrm rot="5400000">
-            <a:off x="3258713" y="-1104833"/>
-            <a:ext cx="244755" cy="3373726"/>
+            <a:off x="3097548" y="-933549"/>
+            <a:ext cx="289364" cy="3018734"/>
           </a:xfrm>
           <a:prstGeom prst="bentConnector3">
-            <a:avLst/>
+            <a:avLst>
+              <a:gd name="adj1" fmla="val 50000"/>
+            </a:avLst>
           </a:prstGeom>
           <a:ln w="12700">
             <a:solidFill>
@@ -1168,7 +1177,7 @@
         </p:nvSpPr>
         <p:spPr>
           <a:xfrm>
-            <a:off x="1188944" y="2005532"/>
+            <a:off x="1172468" y="2005532"/>
             <a:ext cx="1122431" cy="230832"/>
           </a:xfrm>
           <a:prstGeom prst="rect">
@@ -1199,8 +1208,8 @@
         </p:nvSpPr>
         <p:spPr>
           <a:xfrm>
-            <a:off x="451917" y="2801380"/>
-            <a:ext cx="675247" cy="461474"/>
+            <a:off x="437283" y="2606519"/>
+            <a:ext cx="627269" cy="289308"/>
           </a:xfrm>
           <a:prstGeom prst="rect">
             <a:avLst/>
@@ -1267,7 +1276,7 @@
         </p:nvSpPr>
         <p:spPr>
           <a:xfrm>
-            <a:off x="454110" y="3677167"/>
+            <a:off x="330540" y="3125227"/>
             <a:ext cx="835702" cy="832144"/>
           </a:xfrm>
           <a:prstGeom prst="rect">
@@ -1406,7 +1415,7 @@
         </p:nvSpPr>
         <p:spPr>
           <a:xfrm>
-            <a:off x="4038789" y="693557"/>
+            <a:off x="4187073" y="693557"/>
             <a:ext cx="1122431" cy="230832"/>
           </a:xfrm>
           <a:prstGeom prst="rect">
@@ -1441,7 +1450,7 @@
         </p:nvSpPr>
         <p:spPr>
           <a:xfrm>
-            <a:off x="7377824" y="1091947"/>
+            <a:off x="7493156" y="1207129"/>
             <a:ext cx="1540749" cy="636776"/>
           </a:xfrm>
           <a:prstGeom prst="rect">
@@ -1493,17 +1502,20 @@
       <p:cxnSp>
         <p:nvCxnSpPr>
           <p:cNvPr id="336" name="Conector angular 335"/>
-          <p:cNvCxnSpPr/>
+          <p:cNvCxnSpPr>
+            <a:stCxn id="4" idx="2"/>
+            <a:endCxn id="361" idx="0"/>
+          </p:cNvCxnSpPr>
           <p:nvPr/>
         </p:nvCxnSpPr>
         <p:spPr>
           <a:xfrm rot="16200000" flipH="1">
-            <a:off x="6423294" y="-1161466"/>
-            <a:ext cx="314563" cy="3480157"/>
+            <a:off x="6334490" y="-1151758"/>
+            <a:ext cx="348679" cy="3514465"/>
           </a:xfrm>
           <a:prstGeom prst="bentConnector3">
             <a:avLst>
-              <a:gd name="adj1" fmla="val 50001"/>
+              <a:gd name="adj1" fmla="val 50000"/>
             </a:avLst>
           </a:prstGeom>
           <a:ln w="12700">
@@ -1535,7 +1547,7 @@
         </p:nvSpPr>
         <p:spPr>
           <a:xfrm>
-            <a:off x="7670538" y="745699"/>
+            <a:off x="7704846" y="779815"/>
             <a:ext cx="1122431" cy="230832"/>
           </a:xfrm>
           <a:prstGeom prst="rect">
@@ -1573,8 +1585,8 @@
         </p:nvCxnSpPr>
         <p:spPr>
           <a:xfrm rot="5400000">
-            <a:off x="8132269" y="992462"/>
-            <a:ext cx="115416" cy="83555"/>
+            <a:off x="8166556" y="1107623"/>
+            <a:ext cx="196482" cy="2531"/>
           </a:xfrm>
           <a:prstGeom prst="bentConnector3">
             <a:avLst>
@@ -1610,8 +1622,8 @@
         </p:nvSpPr>
         <p:spPr>
           <a:xfrm>
-            <a:off x="1307735" y="2790976"/>
-            <a:ext cx="757138" cy="550390"/>
+            <a:off x="1357262" y="2609740"/>
+            <a:ext cx="725106" cy="299712"/>
           </a:xfrm>
           <a:prstGeom prst="rect">
             <a:avLst/>
@@ -1678,7 +1690,7 @@
         </p:nvSpPr>
         <p:spPr>
           <a:xfrm>
-            <a:off x="1441482" y="3645300"/>
+            <a:off x="1301436" y="3109836"/>
             <a:ext cx="835702" cy="864011"/>
           </a:xfrm>
           <a:prstGeom prst="rect">
@@ -1746,7 +1758,7 @@
         </p:nvSpPr>
         <p:spPr>
           <a:xfrm>
-            <a:off x="4706850" y="1150017"/>
+            <a:off x="4945752" y="1174731"/>
             <a:ext cx="1036231" cy="236451"/>
           </a:xfrm>
           <a:prstGeom prst="rect">
@@ -1803,7 +1815,7 @@
         </p:nvSpPr>
         <p:spPr>
           <a:xfrm>
-            <a:off x="3219604" y="1536387"/>
+            <a:off x="3236080" y="1627005"/>
             <a:ext cx="1122431" cy="230832"/>
           </a:xfrm>
           <a:prstGeom prst="rect">
@@ -1834,8 +1846,8 @@
         </p:nvSpPr>
         <p:spPr>
           <a:xfrm>
-            <a:off x="3219604" y="2037895"/>
-            <a:ext cx="1364746" cy="485631"/>
+            <a:off x="3128986" y="2062610"/>
+            <a:ext cx="1337692" cy="393412"/>
           </a:xfrm>
           <a:prstGeom prst="rect">
             <a:avLst/>
@@ -1894,7 +1906,7 @@
         </p:nvSpPr>
         <p:spPr>
           <a:xfrm>
-            <a:off x="6626827" y="3271476"/>
+            <a:off x="6888153" y="3719960"/>
             <a:ext cx="1122431" cy="369332"/>
           </a:xfrm>
           <a:prstGeom prst="rect">
@@ -1925,7 +1937,7 @@
         </p:nvSpPr>
         <p:spPr>
           <a:xfrm>
-            <a:off x="3503806" y="2921169"/>
+            <a:off x="3240190" y="2550816"/>
             <a:ext cx="1117174" cy="369332"/>
           </a:xfrm>
           <a:prstGeom prst="rect">
@@ -1960,7 +1972,7 @@
         </p:nvSpPr>
         <p:spPr>
           <a:xfrm>
-            <a:off x="3516535" y="3733491"/>
+            <a:off x="3230840" y="3066745"/>
             <a:ext cx="1136982" cy="622258"/>
           </a:xfrm>
           <a:prstGeom prst="rect">
@@ -2028,7 +2040,7 @@
         </p:nvSpPr>
         <p:spPr>
           <a:xfrm>
-            <a:off x="6880007" y="3747076"/>
+            <a:off x="8317102" y="4478842"/>
             <a:ext cx="711456" cy="318674"/>
           </a:xfrm>
           <a:prstGeom prst="rect">
@@ -2088,7 +2100,7 @@
         </p:nvSpPr>
         <p:spPr>
           <a:xfrm>
-            <a:off x="8052959" y="3529829"/>
+            <a:off x="8253891" y="4994611"/>
             <a:ext cx="846909" cy="626027"/>
           </a:xfrm>
           <a:prstGeom prst="rect">
@@ -2144,8 +2156,8 @@
         </p:nvSpPr>
         <p:spPr>
           <a:xfrm>
-            <a:off x="7992200" y="4287170"/>
-            <a:ext cx="1004523" cy="566319"/>
+            <a:off x="7156637" y="4999874"/>
+            <a:ext cx="990590" cy="538473"/>
           </a:xfrm>
           <a:prstGeom prst="rect">
             <a:avLst/>
@@ -2199,8 +2211,8 @@
         </p:nvSpPr>
         <p:spPr>
           <a:xfrm>
-            <a:off x="5004599" y="5536718"/>
-            <a:ext cx="1355796" cy="372284"/>
+            <a:off x="6423064" y="5611548"/>
+            <a:ext cx="1020664" cy="593963"/>
           </a:xfrm>
           <a:prstGeom prst="rect">
             <a:avLst/>
@@ -2255,7 +2267,7 @@
         </p:nvSpPr>
         <p:spPr>
           <a:xfrm>
-            <a:off x="6548282" y="5536718"/>
+            <a:off x="5668415" y="6314208"/>
             <a:ext cx="996529" cy="383645"/>
           </a:xfrm>
           <a:prstGeom prst="rect">
@@ -2311,8 +2323,8 @@
         </p:nvSpPr>
         <p:spPr>
           <a:xfrm>
-            <a:off x="7670538" y="5541132"/>
-            <a:ext cx="1355796" cy="571448"/>
+            <a:off x="4751540" y="5620637"/>
+            <a:ext cx="1162382" cy="591527"/>
           </a:xfrm>
           <a:prstGeom prst="rect">
             <a:avLst/>
@@ -2367,7 +2379,7 @@
         </p:nvSpPr>
         <p:spPr>
           <a:xfrm>
-            <a:off x="2245444" y="2801380"/>
+            <a:off x="2336062" y="2620144"/>
             <a:ext cx="600252" cy="193910"/>
           </a:xfrm>
           <a:prstGeom prst="rect">
@@ -2427,7 +2439,7 @@
         </p:nvSpPr>
         <p:spPr>
           <a:xfrm>
-            <a:off x="2428854" y="3645300"/>
+            <a:off x="2222906" y="3101599"/>
             <a:ext cx="835702" cy="864011"/>
           </a:xfrm>
           <a:prstGeom prst="rect">
@@ -2495,7 +2507,7 @@
         </p:nvSpPr>
         <p:spPr>
           <a:xfrm>
-            <a:off x="3276335" y="1086408"/>
+            <a:off x="3281491" y="1160271"/>
             <a:ext cx="1036231" cy="236451"/>
           </a:xfrm>
           <a:prstGeom prst="rect">
@@ -2552,7 +2564,7 @@
         </p:nvSpPr>
         <p:spPr>
           <a:xfrm>
-            <a:off x="4754278" y="2038954"/>
+            <a:off x="4951990" y="2104858"/>
             <a:ext cx="1037016" cy="736431"/>
           </a:xfrm>
           <a:prstGeom prst="rect">
@@ -2612,7 +2624,7 @@
         </p:nvSpPr>
         <p:spPr>
           <a:xfrm>
-            <a:off x="4560066" y="1523082"/>
+            <a:off x="4906058" y="1761978"/>
             <a:ext cx="1122431" cy="230832"/>
           </a:xfrm>
           <a:prstGeom prst="rect">
@@ -2643,7 +2655,7 @@
         </p:nvSpPr>
         <p:spPr>
           <a:xfrm>
-            <a:off x="6090639" y="1130697"/>
+            <a:off x="6329355" y="1146413"/>
             <a:ext cx="1036231" cy="504666"/>
           </a:xfrm>
           <a:prstGeom prst="rect">
@@ -2700,7 +2712,7 @@
         </p:nvSpPr>
         <p:spPr>
           <a:xfrm>
-            <a:off x="6013078" y="2126259"/>
+            <a:off x="6177837" y="2126259"/>
             <a:ext cx="1364746" cy="733825"/>
           </a:xfrm>
           <a:prstGeom prst="rect">
@@ -2760,7 +2772,7 @@
         </p:nvSpPr>
         <p:spPr>
           <a:xfrm>
-            <a:off x="5305024" y="3700648"/>
+            <a:off x="4439239" y="4351938"/>
             <a:ext cx="1243258" cy="442019"/>
           </a:xfrm>
           <a:prstGeom prst="rect">
@@ -2852,7 +2864,7 @@
         </p:nvSpPr>
         <p:spPr>
           <a:xfrm>
-            <a:off x="5290939" y="4527967"/>
+            <a:off x="3240190" y="4348901"/>
             <a:ext cx="1069407" cy="416204"/>
           </a:xfrm>
           <a:prstGeom prst="rect">
@@ -2944,7 +2956,7 @@
         </p:nvSpPr>
         <p:spPr>
           <a:xfrm>
-            <a:off x="4843855" y="3309393"/>
+            <a:off x="3916329" y="3737829"/>
             <a:ext cx="1117174" cy="230832"/>
           </a:xfrm>
           <a:prstGeom prst="rect">
@@ -2975,7 +2987,7 @@
         </p:nvSpPr>
         <p:spPr>
           <a:xfrm>
-            <a:off x="6880005" y="4256748"/>
+            <a:off x="7196831" y="4476517"/>
             <a:ext cx="905096" cy="318674"/>
           </a:xfrm>
           <a:prstGeom prst="rect">
@@ -3035,7 +3047,7 @@
         </p:nvSpPr>
         <p:spPr>
           <a:xfrm>
-            <a:off x="6880005" y="4813159"/>
+            <a:off x="5851107" y="4475434"/>
             <a:ext cx="638395" cy="318674"/>
           </a:xfrm>
           <a:prstGeom prst="rect">
@@ -3098,13 +3110,16 @@
       <p:cxnSp>
         <p:nvCxnSpPr>
           <p:cNvPr id="177" name="Conector angular 176"/>
-          <p:cNvCxnSpPr/>
+          <p:cNvCxnSpPr>
+            <a:stCxn id="274" idx="2"/>
+            <a:endCxn id="136" idx="0"/>
+          </p:cNvCxnSpPr>
           <p:nvPr/>
         </p:nvCxnSpPr>
         <p:spPr>
           <a:xfrm rot="5400000">
-            <a:off x="4104365" y="545714"/>
-            <a:ext cx="199585" cy="819412"/>
+            <a:off x="4156007" y="567989"/>
+            <a:ext cx="235882" cy="948682"/>
           </a:xfrm>
           <a:prstGeom prst="bentConnector3">
             <a:avLst>
@@ -3135,13 +3150,16 @@
       <p:cxnSp>
         <p:nvCxnSpPr>
           <p:cNvPr id="192" name="Conector angular 191"/>
-          <p:cNvCxnSpPr/>
+          <p:cNvCxnSpPr>
+            <a:stCxn id="274" idx="2"/>
+            <a:endCxn id="176" idx="0"/>
+          </p:cNvCxnSpPr>
           <p:nvPr/>
         </p:nvCxnSpPr>
         <p:spPr>
-          <a:xfrm>
-            <a:off x="4588916" y="960771"/>
-            <a:ext cx="1022833" cy="189246"/>
+          <a:xfrm rot="16200000" flipH="1">
+            <a:off x="4980907" y="691770"/>
+            <a:ext cx="250342" cy="715579"/>
           </a:xfrm>
           <a:prstGeom prst="bentConnector3">
             <a:avLst>
@@ -3173,17 +3191,20 @@
         <p:nvCxnSpPr>
           <p:cNvPr id="197" name="Conector angular 196"/>
           <p:cNvCxnSpPr>
+            <a:stCxn id="274" idx="2"/>
             <a:endCxn id="156" idx="0"/>
           </p:cNvCxnSpPr>
           <p:nvPr/>
         </p:nvCxnSpPr>
         <p:spPr>
-          <a:xfrm>
-            <a:off x="5131842" y="960771"/>
-            <a:ext cx="1476913" cy="169926"/>
-          </a:xfrm>
-          <a:prstGeom prst="bentConnector2">
-            <a:avLst/>
+          <a:xfrm rot="16200000" flipH="1">
+            <a:off x="5686868" y="-14190"/>
+            <a:ext cx="222024" cy="2099182"/>
+          </a:xfrm>
+          <a:prstGeom prst="bentConnector3">
+            <a:avLst>
+              <a:gd name="adj1" fmla="val 50000"/>
+            </a:avLst>
           </a:prstGeom>
           <a:ln w="12700">
             <a:solidFill>
@@ -3214,7 +3235,7 @@
         </p:nvSpPr>
         <p:spPr>
           <a:xfrm>
-            <a:off x="6058537" y="1751943"/>
+            <a:off x="6289197" y="1751943"/>
             <a:ext cx="1122431" cy="230832"/>
           </a:xfrm>
           <a:prstGeom prst="rect">
@@ -3239,134 +3260,17 @@
       </p:sp>
       <p:cxnSp>
         <p:nvCxnSpPr>
-          <p:cNvPr id="128" name="Conector recto 127"/>
-          <p:cNvCxnSpPr/>
+          <p:cNvPr id="223" name="Conector recto 222"/>
+          <p:cNvCxnSpPr>
+            <a:stCxn id="135" idx="2"/>
+            <a:endCxn id="148" idx="0"/>
+          </p:cNvCxnSpPr>
           <p:nvPr/>
         </p:nvCxnSpPr>
         <p:spPr>
-          <a:xfrm>
-            <a:off x="789540" y="2530417"/>
-            <a:ext cx="1882578" cy="0"/>
-          </a:xfrm>
-          <a:prstGeom prst="line">
-            <a:avLst/>
-          </a:prstGeom>
-        </p:spPr>
-        <p:style>
-          <a:lnRef idx="1">
-            <a:schemeClr val="dk1"/>
-          </a:lnRef>
-          <a:fillRef idx="0">
-            <a:schemeClr val="dk1"/>
-          </a:fillRef>
-          <a:effectRef idx="0">
-            <a:schemeClr val="dk1"/>
-          </a:effectRef>
-          <a:fontRef idx="minor">
-            <a:schemeClr val="tx1"/>
-          </a:fontRef>
-        </p:style>
-      </p:cxnSp>
-      <p:cxnSp>
-        <p:nvCxnSpPr>
-          <p:cNvPr id="131" name="Conector recto 130"/>
-          <p:cNvCxnSpPr/>
-          <p:nvPr/>
-        </p:nvCxnSpPr>
-        <p:spPr>
-          <a:xfrm>
-            <a:off x="771794" y="2530417"/>
-            <a:ext cx="9525" cy="270963"/>
-          </a:xfrm>
-          <a:prstGeom prst="line">
-            <a:avLst/>
-          </a:prstGeom>
-        </p:spPr>
-        <p:style>
-          <a:lnRef idx="1">
-            <a:schemeClr val="dk1"/>
-          </a:lnRef>
-          <a:fillRef idx="0">
-            <a:schemeClr val="dk1"/>
-          </a:fillRef>
-          <a:effectRef idx="0">
-            <a:schemeClr val="dk1"/>
-          </a:effectRef>
-          <a:fontRef idx="minor">
-            <a:schemeClr val="tx1"/>
-          </a:fontRef>
-        </p:style>
-      </p:cxnSp>
-      <p:cxnSp>
-        <p:nvCxnSpPr>
-          <p:cNvPr id="134" name="Conector recto 133"/>
-          <p:cNvCxnSpPr/>
-          <p:nvPr/>
-        </p:nvCxnSpPr>
-        <p:spPr>
           <a:xfrm flipH="1">
-            <a:off x="1688685" y="2530417"/>
-            <a:ext cx="11084" cy="260559"/>
-          </a:xfrm>
-          <a:prstGeom prst="line">
-            <a:avLst/>
-          </a:prstGeom>
-        </p:spPr>
-        <p:style>
-          <a:lnRef idx="1">
-            <a:schemeClr val="dk1"/>
-          </a:lnRef>
-          <a:fillRef idx="0">
-            <a:schemeClr val="dk1"/>
-          </a:fillRef>
-          <a:effectRef idx="0">
-            <a:schemeClr val="dk1"/>
-          </a:effectRef>
-          <a:fontRef idx="minor">
-            <a:schemeClr val="tx1"/>
-          </a:fontRef>
-        </p:style>
-      </p:cxnSp>
-      <p:cxnSp>
-        <p:nvCxnSpPr>
-          <p:cNvPr id="138" name="Conector recto 137"/>
-          <p:cNvCxnSpPr/>
-          <p:nvPr/>
-        </p:nvCxnSpPr>
-        <p:spPr>
-          <a:xfrm flipH="1">
-            <a:off x="2659685" y="2520013"/>
-            <a:ext cx="12433" cy="270963"/>
-          </a:xfrm>
-          <a:prstGeom prst="line">
-            <a:avLst/>
-          </a:prstGeom>
-        </p:spPr>
-        <p:style>
-          <a:lnRef idx="1">
-            <a:schemeClr val="dk1"/>
-          </a:lnRef>
-          <a:fillRef idx="0">
-            <a:schemeClr val="dk1"/>
-          </a:fillRef>
-          <a:effectRef idx="0">
-            <a:schemeClr val="dk1"/>
-          </a:effectRef>
-          <a:fontRef idx="minor">
-            <a:schemeClr val="tx1"/>
-          </a:fontRef>
-        </p:style>
-      </p:cxnSp>
-      <p:cxnSp>
-        <p:nvCxnSpPr>
-          <p:cNvPr id="223" name="Conector recto 222"/>
-          <p:cNvCxnSpPr/>
-          <p:nvPr/>
-        </p:nvCxnSpPr>
-        <p:spPr>
-          <a:xfrm>
-            <a:off x="1705735" y="3355542"/>
-            <a:ext cx="4763" cy="275581"/>
+            <a:off x="1719287" y="2909452"/>
+            <a:ext cx="528" cy="200384"/>
           </a:xfrm>
           <a:prstGeom prst="line">
             <a:avLst/>
@@ -3390,13 +3294,16 @@
       <p:cxnSp>
         <p:nvCxnSpPr>
           <p:cNvPr id="234" name="Conector recto 233"/>
-          <p:cNvCxnSpPr/>
+          <p:cNvCxnSpPr>
+            <a:stCxn id="44" idx="2"/>
+            <a:endCxn id="72" idx="0"/>
+          </p:cNvCxnSpPr>
           <p:nvPr/>
         </p:nvCxnSpPr>
         <p:spPr>
           <a:xfrm flipH="1">
-            <a:off x="816654" y="3262854"/>
-            <a:ext cx="1" cy="414313"/>
+            <a:off x="748391" y="2895827"/>
+            <a:ext cx="2527" cy="229400"/>
           </a:xfrm>
           <a:prstGeom prst="line">
             <a:avLst/>
@@ -3420,13 +3327,16 @@
       <p:cxnSp>
         <p:nvCxnSpPr>
           <p:cNvPr id="240" name="Conector recto 239"/>
-          <p:cNvCxnSpPr/>
+          <p:cNvCxnSpPr>
+            <a:stCxn id="88" idx="2"/>
+            <a:endCxn id="118" idx="0"/>
+          </p:cNvCxnSpPr>
           <p:nvPr/>
         </p:nvCxnSpPr>
         <p:spPr>
-          <a:xfrm flipH="1">
-            <a:off x="2628900" y="3025092"/>
-            <a:ext cx="16188" cy="625040"/>
+          <a:xfrm>
+            <a:off x="2636188" y="2814054"/>
+            <a:ext cx="4569" cy="287545"/>
           </a:xfrm>
           <a:prstGeom prst="line">
             <a:avLst/>
@@ -3452,13 +3362,14 @@
           <p:cNvPr id="244" name="Conector recto 243"/>
           <p:cNvCxnSpPr>
             <a:stCxn id="185" idx="2"/>
+            <a:endCxn id="232" idx="0"/>
           </p:cNvCxnSpPr>
           <p:nvPr/>
         </p:nvCxnSpPr>
         <p:spPr>
-          <a:xfrm flipH="1">
-            <a:off x="3780819" y="1767219"/>
-            <a:ext cx="1" cy="270676"/>
+          <a:xfrm>
+            <a:off x="3797296" y="1857837"/>
+            <a:ext cx="536" cy="204773"/>
           </a:xfrm>
           <a:prstGeom prst="line">
             <a:avLst/>
@@ -3483,14 +3394,15 @@
         <p:nvCxnSpPr>
           <p:cNvPr id="247" name="Conector recto 246"/>
           <p:cNvCxnSpPr>
+            <a:stCxn id="136" idx="2"/>
             <a:endCxn id="185" idx="0"/>
           </p:cNvCxnSpPr>
           <p:nvPr/>
         </p:nvCxnSpPr>
         <p:spPr>
-          <a:xfrm>
-            <a:off x="3780820" y="1344183"/>
-            <a:ext cx="0" cy="192204"/>
+          <a:xfrm flipH="1">
+            <a:off x="3797296" y="1396722"/>
+            <a:ext cx="2311" cy="230283"/>
           </a:xfrm>
           <a:prstGeom prst="line">
             <a:avLst/>
@@ -3514,13 +3426,16 @@
       <p:cxnSp>
         <p:nvCxnSpPr>
           <p:cNvPr id="249" name="Conector recto 248"/>
-          <p:cNvCxnSpPr/>
+          <p:cNvCxnSpPr>
+            <a:stCxn id="176" idx="2"/>
+            <a:endCxn id="153" idx="0"/>
+          </p:cNvCxnSpPr>
           <p:nvPr/>
         </p:nvCxnSpPr>
         <p:spPr>
           <a:xfrm>
-            <a:off x="5109018" y="1410335"/>
-            <a:ext cx="0" cy="192204"/>
+            <a:off x="5463868" y="1411182"/>
+            <a:ext cx="3406" cy="350796"/>
           </a:xfrm>
           <a:prstGeom prst="line">
             <a:avLst/>
@@ -3544,13 +3459,16 @@
       <p:cxnSp>
         <p:nvCxnSpPr>
           <p:cNvPr id="250" name="Conector recto 249"/>
-          <p:cNvCxnSpPr/>
+          <p:cNvCxnSpPr>
+            <a:stCxn id="153" idx="2"/>
+            <a:endCxn id="150" idx="0"/>
+          </p:cNvCxnSpPr>
           <p:nvPr/>
         </p:nvCxnSpPr>
         <p:spPr>
-          <a:xfrm flipH="1">
-            <a:off x="5139724" y="1759533"/>
-            <a:ext cx="1" cy="270676"/>
+          <a:xfrm>
+            <a:off x="5467274" y="1992810"/>
+            <a:ext cx="3224" cy="112048"/>
           </a:xfrm>
           <a:prstGeom prst="line">
             <a:avLst/>
@@ -3574,13 +3492,16 @@
       <p:cxnSp>
         <p:nvCxnSpPr>
           <p:cNvPr id="251" name="Conector recto 250"/>
-          <p:cNvCxnSpPr/>
+          <p:cNvCxnSpPr>
+            <a:stCxn id="156" idx="2"/>
+            <a:endCxn id="200" idx="0"/>
+          </p:cNvCxnSpPr>
           <p:nvPr/>
         </p:nvCxnSpPr>
         <p:spPr>
           <a:xfrm>
-            <a:off x="6619753" y="1635363"/>
-            <a:ext cx="0" cy="192204"/>
+            <a:off x="6847471" y="1651079"/>
+            <a:ext cx="2942" cy="100864"/>
           </a:xfrm>
           <a:prstGeom prst="line">
             <a:avLst/>
@@ -3604,13 +3525,16 @@
       <p:cxnSp>
         <p:nvCxnSpPr>
           <p:cNvPr id="252" name="Conector recto 251"/>
-          <p:cNvCxnSpPr/>
+          <p:cNvCxnSpPr>
+            <a:stCxn id="200" idx="2"/>
+            <a:endCxn id="157" idx="0"/>
+          </p:cNvCxnSpPr>
           <p:nvPr/>
         </p:nvCxnSpPr>
         <p:spPr>
           <a:xfrm>
-            <a:off x="6632895" y="1949988"/>
-            <a:ext cx="0" cy="192204"/>
+            <a:off x="6850413" y="1982775"/>
+            <a:ext cx="9797" cy="143484"/>
           </a:xfrm>
           <a:prstGeom prst="line">
             <a:avLst/>
@@ -3634,13 +3558,16 @@
       <p:cxnSp>
         <p:nvCxnSpPr>
           <p:cNvPr id="190" name="Conector recto 189"/>
-          <p:cNvCxnSpPr/>
+          <p:cNvCxnSpPr>
+            <a:stCxn id="232" idx="2"/>
+            <a:endCxn id="374" idx="0"/>
+          </p:cNvCxnSpPr>
           <p:nvPr/>
         </p:nvCxnSpPr>
         <p:spPr>
           <a:xfrm>
-            <a:off x="3901977" y="2588817"/>
-            <a:ext cx="0" cy="373388"/>
+            <a:off x="3797832" y="2456022"/>
+            <a:ext cx="945" cy="94794"/>
           </a:xfrm>
           <a:prstGeom prst="line">
             <a:avLst/>
@@ -3664,13 +3591,16 @@
       <p:cxnSp>
         <p:nvCxnSpPr>
           <p:cNvPr id="193" name="Conector recto 192"/>
-          <p:cNvCxnSpPr/>
+          <p:cNvCxnSpPr>
+            <a:stCxn id="374" idx="2"/>
+            <a:endCxn id="377" idx="0"/>
+          </p:cNvCxnSpPr>
           <p:nvPr/>
         </p:nvCxnSpPr>
         <p:spPr>
           <a:xfrm>
-            <a:off x="3901977" y="3359848"/>
-            <a:ext cx="0" cy="373643"/>
+            <a:off x="3798777" y="2920148"/>
+            <a:ext cx="554" cy="146597"/>
           </a:xfrm>
           <a:prstGeom prst="line">
             <a:avLst/>
@@ -3685,75 +3615,6 @@
           </a:fillRef>
           <a:effectRef idx="0">
             <a:schemeClr val="dk1"/>
-          </a:effectRef>
-          <a:fontRef idx="minor">
-            <a:schemeClr val="tx1"/>
-          </a:fontRef>
-        </p:style>
-      </p:cxnSp>
-      <p:cxnSp>
-        <p:nvCxnSpPr>
-          <p:cNvPr id="203" name="Conector angular 202"/>
-          <p:cNvCxnSpPr/>
-          <p:nvPr/>
-        </p:nvCxnSpPr>
-        <p:spPr>
-          <a:xfrm rot="5400000">
-            <a:off x="4769849" y="4201843"/>
-            <a:ext cx="892535" cy="175917"/>
-          </a:xfrm>
-          <a:prstGeom prst="bentConnector3">
-            <a:avLst>
-              <a:gd name="adj1" fmla="val 15139"/>
-            </a:avLst>
-          </a:prstGeom>
-        </p:spPr>
-        <p:style>
-          <a:lnRef idx="1">
-            <a:schemeClr val="dk1"/>
-          </a:lnRef>
-          <a:fillRef idx="0">
-            <a:schemeClr val="dk1"/>
-          </a:fillRef>
-          <a:effectRef idx="0">
-            <a:schemeClr val="dk1"/>
-          </a:effectRef>
-          <a:fontRef idx="minor">
-            <a:schemeClr val="tx1"/>
-          </a:fontRef>
-        </p:style>
-      </p:cxnSp>
-      <p:cxnSp>
-        <p:nvCxnSpPr>
-          <p:cNvPr id="208" name="Conector recto 207"/>
-          <p:cNvCxnSpPr>
-            <a:endCxn id="164" idx="1"/>
-          </p:cNvCxnSpPr>
-          <p:nvPr/>
-        </p:nvCxnSpPr>
-        <p:spPr>
-          <a:xfrm>
-            <a:off x="5124368" y="4736069"/>
-            <a:ext cx="166571" cy="0"/>
-          </a:xfrm>
-          <a:prstGeom prst="line">
-            <a:avLst/>
-          </a:prstGeom>
-          <a:ln>
-            <a:solidFill>
-              <a:schemeClr val="tx1"/>
-            </a:solidFill>
-          </a:ln>
-        </p:spPr>
-        <p:style>
-          <a:lnRef idx="1">
-            <a:schemeClr val="accent1"/>
-          </a:lnRef>
-          <a:fillRef idx="0">
-            <a:schemeClr val="accent1"/>
-          </a:fillRef>
-          <a:effectRef idx="0">
-            <a:schemeClr val="accent1"/>
           </a:effectRef>
           <a:fontRef idx="minor">
             <a:schemeClr val="tx1"/>
@@ -3771,7 +3632,7 @@
         </p:nvCxnSpPr>
         <p:spPr>
           <a:xfrm>
-            <a:off x="5402442" y="3540225"/>
+            <a:off x="4474916" y="3968661"/>
             <a:ext cx="0" cy="0"/>
           </a:xfrm>
           <a:prstGeom prst="line">
@@ -3804,7 +3665,7 @@
         </p:nvCxnSpPr>
         <p:spPr>
           <a:xfrm>
-            <a:off x="5402442" y="3540225"/>
+            <a:off x="4474916" y="3968661"/>
             <a:ext cx="0" cy="0"/>
           </a:xfrm>
           <a:prstGeom prst="line">
@@ -3837,49 +3698,12 @@
         </p:nvCxnSpPr>
         <p:spPr>
           <a:xfrm>
-            <a:off x="5402442" y="3540225"/>
+            <a:off x="4474916" y="3968661"/>
             <a:ext cx="0" cy="0"/>
           </a:xfrm>
           <a:prstGeom prst="line">
             <a:avLst/>
           </a:prstGeom>
-        </p:spPr>
-        <p:style>
-          <a:lnRef idx="1">
-            <a:schemeClr val="accent1"/>
-          </a:lnRef>
-          <a:fillRef idx="0">
-            <a:schemeClr val="accent1"/>
-          </a:fillRef>
-          <a:effectRef idx="0">
-            <a:schemeClr val="accent1"/>
-          </a:effectRef>
-          <a:fontRef idx="minor">
-            <a:schemeClr val="tx1"/>
-          </a:fontRef>
-        </p:style>
-      </p:cxnSp>
-      <p:cxnSp>
-        <p:nvCxnSpPr>
-          <p:cNvPr id="285" name="Conector angular 284"/>
-          <p:cNvCxnSpPr/>
-          <p:nvPr/>
-        </p:nvCxnSpPr>
-        <p:spPr>
-          <a:xfrm rot="5400000">
-            <a:off x="4996103" y="3603413"/>
-            <a:ext cx="482089" cy="181924"/>
-          </a:xfrm>
-          <a:prstGeom prst="bentConnector3">
-            <a:avLst>
-              <a:gd name="adj1" fmla="val 16411"/>
-            </a:avLst>
-          </a:prstGeom>
-          <a:ln>
-            <a:solidFill>
-              <a:schemeClr val="tx1"/>
-            </a:solidFill>
-          </a:ln>
         </p:spPr>
         <p:style>
           <a:lnRef idx="1">
@@ -3899,46 +3723,21 @@
       <p:cxnSp>
         <p:nvCxnSpPr>
           <p:cNvPr id="313" name="Conector angular 312"/>
-          <p:cNvCxnSpPr/>
+          <p:cNvCxnSpPr>
+            <a:stCxn id="150" idx="2"/>
+            <a:endCxn id="277" idx="0"/>
+          </p:cNvCxnSpPr>
           <p:nvPr/>
         </p:nvCxnSpPr>
         <p:spPr>
-          <a:xfrm>
-            <a:off x="5674137" y="3068481"/>
-            <a:ext cx="1400466" cy="179501"/>
-          </a:xfrm>
-          <a:prstGeom prst="bentConnector2">
-            <a:avLst/>
-          </a:prstGeom>
-        </p:spPr>
-        <p:style>
-          <a:lnRef idx="1">
-            <a:schemeClr val="dk1"/>
-          </a:lnRef>
-          <a:fillRef idx="0">
-            <a:schemeClr val="dk1"/>
-          </a:fillRef>
-          <a:effectRef idx="0">
-            <a:schemeClr val="dk1"/>
-          </a:effectRef>
-          <a:fontRef idx="minor">
-            <a:schemeClr val="tx1"/>
-          </a:fontRef>
-        </p:style>
-      </p:cxnSp>
-      <p:cxnSp>
-        <p:nvCxnSpPr>
-          <p:cNvPr id="319" name="Conector angular 318"/>
-          <p:cNvCxnSpPr/>
-          <p:nvPr/>
-        </p:nvCxnSpPr>
-        <p:spPr>
-          <a:xfrm>
-            <a:off x="5121281" y="2835572"/>
-            <a:ext cx="552856" cy="239330"/>
+          <a:xfrm rot="16200000" flipH="1">
+            <a:off x="6020598" y="2291188"/>
+            <a:ext cx="878671" cy="1978871"/>
           </a:xfrm>
           <a:prstGeom prst="bentConnector3">
-            <a:avLst/>
+            <a:avLst>
+              <a:gd name="adj1" fmla="val 50000"/>
+            </a:avLst>
           </a:prstGeom>
         </p:spPr>
         <p:style>
@@ -3959,17 +3758,20 @@
       <p:cxnSp>
         <p:nvCxnSpPr>
           <p:cNvPr id="321" name="Conector angular 320"/>
-          <p:cNvCxnSpPr/>
+          <p:cNvCxnSpPr>
+            <a:stCxn id="150" idx="2"/>
+            <a:endCxn id="172" idx="0"/>
+          </p:cNvCxnSpPr>
           <p:nvPr/>
         </p:nvCxnSpPr>
         <p:spPr>
           <a:xfrm rot="5400000">
-            <a:off x="5396040" y="3101109"/>
-            <a:ext cx="156439" cy="143633"/>
+            <a:off x="4524437" y="2791768"/>
+            <a:ext cx="896540" cy="995582"/>
           </a:xfrm>
           <a:prstGeom prst="bentConnector3">
             <a:avLst>
-              <a:gd name="adj1" fmla="val -10886"/>
+              <a:gd name="adj1" fmla="val 50000"/>
             </a:avLst>
           </a:prstGeom>
         </p:spPr>
@@ -3992,17 +3794,20 @@
         <p:nvCxnSpPr>
           <p:cNvPr id="342" name="Conector angular 341"/>
           <p:cNvCxnSpPr>
-            <a:endCxn id="390" idx="1"/>
+            <a:stCxn id="277" idx="2"/>
+            <a:endCxn id="390" idx="0"/>
           </p:cNvCxnSpPr>
           <p:nvPr/>
         </p:nvCxnSpPr>
         <p:spPr>
           <a:xfrm rot="16200000" flipH="1">
-            <a:off x="6712184" y="3738590"/>
-            <a:ext cx="212038" cy="123607"/>
-          </a:xfrm>
-          <a:prstGeom prst="bentConnector2">
-            <a:avLst/>
+            <a:off x="7866324" y="3672336"/>
+            <a:ext cx="389550" cy="1223461"/>
+          </a:xfrm>
+          <a:prstGeom prst="bentConnector3">
+            <a:avLst>
+              <a:gd name="adj1" fmla="val 50000"/>
+            </a:avLst>
           </a:prstGeom>
         </p:spPr>
         <p:style>
@@ -4024,17 +3829,20 @@
         <p:nvCxnSpPr>
           <p:cNvPr id="344" name="Conector angular 343"/>
           <p:cNvCxnSpPr>
-            <a:endCxn id="174" idx="1"/>
+            <a:stCxn id="277" idx="2"/>
+            <a:endCxn id="174" idx="0"/>
           </p:cNvCxnSpPr>
           <p:nvPr/>
         </p:nvCxnSpPr>
         <p:spPr>
           <a:xfrm rot="16200000" flipH="1">
-            <a:off x="6566903" y="4102983"/>
-            <a:ext cx="502598" cy="123605"/>
-          </a:xfrm>
-          <a:prstGeom prst="bentConnector2">
-            <a:avLst/>
+            <a:off x="7355762" y="4182899"/>
+            <a:ext cx="387225" cy="200010"/>
+          </a:xfrm>
+          <a:prstGeom prst="bentConnector3">
+            <a:avLst>
+              <a:gd name="adj1" fmla="val 50000"/>
+            </a:avLst>
           </a:prstGeom>
         </p:spPr>
         <p:style>
@@ -4056,17 +3864,20 @@
         <p:nvCxnSpPr>
           <p:cNvPr id="346" name="Conector angular 345"/>
           <p:cNvCxnSpPr>
-            <a:endCxn id="175" idx="1"/>
+            <a:stCxn id="277" idx="2"/>
+            <a:endCxn id="175" idx="0"/>
           </p:cNvCxnSpPr>
           <p:nvPr/>
         </p:nvCxnSpPr>
         <p:spPr>
-          <a:xfrm rot="16200000" flipH="1">
-            <a:off x="6535582" y="4628073"/>
-            <a:ext cx="564222" cy="124624"/>
-          </a:xfrm>
-          <a:prstGeom prst="bentConnector2">
-            <a:avLst/>
+          <a:xfrm rot="5400000">
+            <a:off x="6616766" y="3642831"/>
+            <a:ext cx="386142" cy="1279064"/>
+          </a:xfrm>
+          <a:prstGeom prst="bentConnector3">
+            <a:avLst>
+              <a:gd name="adj1" fmla="val 50000"/>
+            </a:avLst>
           </a:prstGeom>
         </p:spPr>
         <p:style>
@@ -4078,43 +3889,6 @@
           </a:fillRef>
           <a:effectRef idx="0">
             <a:schemeClr val="dk1"/>
-          </a:effectRef>
-          <a:fontRef idx="minor">
-            <a:schemeClr val="tx1"/>
-          </a:fontRef>
-        </p:style>
-      </p:cxnSp>
-      <p:cxnSp>
-        <p:nvCxnSpPr>
-          <p:cNvPr id="350" name="Conector angular 349"/>
-          <p:cNvCxnSpPr>
-            <a:stCxn id="277" idx="2"/>
-          </p:cNvCxnSpPr>
-          <p:nvPr/>
-        </p:nvCxnSpPr>
-        <p:spPr>
-          <a:xfrm rot="5400000">
-            <a:off x="6932666" y="3463523"/>
-            <a:ext cx="78092" cy="432662"/>
-          </a:xfrm>
-          <a:prstGeom prst="bentConnector2">
-            <a:avLst/>
-          </a:prstGeom>
-          <a:ln>
-            <a:solidFill>
-              <a:schemeClr val="tx1"/>
-            </a:solidFill>
-          </a:ln>
-        </p:spPr>
-        <p:style>
-          <a:lnRef idx="1">
-            <a:schemeClr val="accent1"/>
-          </a:lnRef>
-          <a:fillRef idx="0">
-            <a:schemeClr val="accent1"/>
-          </a:fillRef>
-          <a:effectRef idx="0">
-            <a:schemeClr val="accent1"/>
           </a:effectRef>
           <a:fontRef idx="minor">
             <a:schemeClr val="tx1"/>
@@ -4125,18 +3899,20 @@
         <p:nvCxnSpPr>
           <p:cNvPr id="358" name="Conector angular 357"/>
           <p:cNvCxnSpPr>
-            <a:stCxn id="390" idx="3"/>
-            <a:endCxn id="458" idx="1"/>
+            <a:stCxn id="390" idx="2"/>
+            <a:endCxn id="458" idx="0"/>
           </p:cNvCxnSpPr>
           <p:nvPr/>
         </p:nvCxnSpPr>
         <p:spPr>
-          <a:xfrm flipV="1">
-            <a:off x="7591463" y="3842843"/>
-            <a:ext cx="461496" cy="63570"/>
+          <a:xfrm rot="16200000" flipH="1">
+            <a:off x="8576541" y="4893805"/>
+            <a:ext cx="197095" cy="4516"/>
           </a:xfrm>
           <a:prstGeom prst="bentConnector3">
-            <a:avLst/>
+            <a:avLst>
+              <a:gd name="adj1" fmla="val 50000"/>
+            </a:avLst>
           </a:prstGeom>
         </p:spPr>
         <p:style>
@@ -4158,50 +3934,20 @@
         <p:nvCxnSpPr>
           <p:cNvPr id="360" name="Conector angular 359"/>
           <p:cNvCxnSpPr>
-            <a:stCxn id="174" idx="3"/>
-            <a:endCxn id="459" idx="1"/>
+            <a:stCxn id="174" idx="2"/>
+            <a:endCxn id="459" idx="0"/>
           </p:cNvCxnSpPr>
           <p:nvPr/>
         </p:nvCxnSpPr>
         <p:spPr>
-          <a:xfrm>
-            <a:off x="7785101" y="4416085"/>
-            <a:ext cx="207099" cy="154245"/>
+          <a:xfrm rot="16200000" flipH="1">
+            <a:off x="7548314" y="4896255"/>
+            <a:ext cx="204683" cy="2553"/>
           </a:xfrm>
           <a:prstGeom prst="bentConnector3">
-            <a:avLst/>
-          </a:prstGeom>
-        </p:spPr>
-        <p:style>
-          <a:lnRef idx="1">
-            <a:schemeClr val="dk1"/>
-          </a:lnRef>
-          <a:fillRef idx="0">
-            <a:schemeClr val="dk1"/>
-          </a:fillRef>
-          <a:effectRef idx="0">
-            <a:schemeClr val="dk1"/>
-          </a:effectRef>
-          <a:fontRef idx="minor">
-            <a:schemeClr val="tx1"/>
-          </a:fontRef>
-        </p:style>
-      </p:cxnSp>
-      <p:cxnSp>
-        <p:nvCxnSpPr>
-          <p:cNvPr id="365" name="Conector angular 364"/>
-          <p:cNvCxnSpPr>
-            <a:endCxn id="175" idx="2"/>
-          </p:cNvCxnSpPr>
-          <p:nvPr/>
-        </p:nvCxnSpPr>
-        <p:spPr>
-          <a:xfrm flipV="1">
-            <a:off x="5402442" y="5131833"/>
-            <a:ext cx="1796761" cy="171749"/>
-          </a:xfrm>
-          <a:prstGeom prst="bentConnector2">
-            <a:avLst/>
+            <a:avLst>
+              <a:gd name="adj1" fmla="val 50000"/>
+            </a:avLst>
           </a:prstGeom>
         </p:spPr>
         <p:style>
@@ -4222,78 +3968,21 @@
       <p:cxnSp>
         <p:nvCxnSpPr>
           <p:cNvPr id="367" name="Conector angular 366"/>
-          <p:cNvCxnSpPr/>
+          <p:cNvCxnSpPr>
+            <a:stCxn id="175" idx="2"/>
+            <a:endCxn id="462" idx="0"/>
+          </p:cNvCxnSpPr>
           <p:nvPr/>
         </p:nvCxnSpPr>
         <p:spPr>
-          <a:xfrm>
-            <a:off x="7180968" y="5301348"/>
-            <a:ext cx="1385998" cy="239784"/>
+          <a:xfrm rot="5400000">
+            <a:off x="5338254" y="4788585"/>
+            <a:ext cx="826529" cy="837574"/>
           </a:xfrm>
           <a:prstGeom prst="bentConnector3">
             <a:avLst>
-              <a:gd name="adj1" fmla="val 87110"/>
+              <a:gd name="adj1" fmla="val 50000"/>
             </a:avLst>
-          </a:prstGeom>
-        </p:spPr>
-        <p:style>
-          <a:lnRef idx="1">
-            <a:schemeClr val="dk1"/>
-          </a:lnRef>
-          <a:fillRef idx="0">
-            <a:schemeClr val="dk1"/>
-          </a:fillRef>
-          <a:effectRef idx="0">
-            <a:schemeClr val="dk1"/>
-          </a:effectRef>
-          <a:fontRef idx="minor">
-            <a:schemeClr val="tx1"/>
-          </a:fontRef>
-        </p:style>
-      </p:cxnSp>
-      <p:cxnSp>
-        <p:nvCxnSpPr>
-          <p:cNvPr id="386" name="Conector recto 385"/>
-          <p:cNvCxnSpPr/>
-          <p:nvPr/>
-        </p:nvCxnSpPr>
-        <p:spPr>
-          <a:xfrm>
-            <a:off x="5402442" y="5303581"/>
-            <a:ext cx="0" cy="219198"/>
-          </a:xfrm>
-          <a:prstGeom prst="line">
-            <a:avLst/>
-          </a:prstGeom>
-        </p:spPr>
-        <p:style>
-          <a:lnRef idx="1">
-            <a:schemeClr val="dk1"/>
-          </a:lnRef>
-          <a:fillRef idx="0">
-            <a:schemeClr val="dk1"/>
-          </a:fillRef>
-          <a:effectRef idx="0">
-            <a:schemeClr val="dk1"/>
-          </a:effectRef>
-          <a:fontRef idx="minor">
-            <a:schemeClr val="tx1"/>
-          </a:fontRef>
-        </p:style>
-      </p:cxnSp>
-      <p:cxnSp>
-        <p:nvCxnSpPr>
-          <p:cNvPr id="388" name="Conector recto 387"/>
-          <p:cNvCxnSpPr/>
-          <p:nvPr/>
-        </p:nvCxnSpPr>
-        <p:spPr>
-          <a:xfrm>
-            <a:off x="7208637" y="5310228"/>
-            <a:ext cx="0" cy="235370"/>
-          </a:xfrm>
-          <a:prstGeom prst="line">
-            <a:avLst/>
           </a:prstGeom>
         </p:spPr>
         <p:style>
@@ -4321,9 +4010,9 @@
           <p:nvPr/>
         </p:nvCxnSpPr>
         <p:spPr>
-          <a:xfrm>
-            <a:off x="1736891" y="1780396"/>
-            <a:ext cx="13269" cy="225136"/>
+          <a:xfrm flipH="1">
+            <a:off x="1733684" y="1780396"/>
+            <a:ext cx="3207" cy="225136"/>
           </a:xfrm>
           <a:prstGeom prst="line">
             <a:avLst/>
@@ -4354,11 +4043,296 @@
         </p:nvCxnSpPr>
         <p:spPr>
           <a:xfrm>
-            <a:off x="1750160" y="2236364"/>
+            <a:off x="1733684" y="2236364"/>
             <a:ext cx="0" cy="302925"/>
           </a:xfrm>
           <a:prstGeom prst="line">
             <a:avLst/>
+          </a:prstGeom>
+        </p:spPr>
+        <p:style>
+          <a:lnRef idx="1">
+            <a:schemeClr val="dk1"/>
+          </a:lnRef>
+          <a:fillRef idx="0">
+            <a:schemeClr val="dk1"/>
+          </a:fillRef>
+          <a:effectRef idx="0">
+            <a:schemeClr val="dk1"/>
+          </a:effectRef>
+          <a:fontRef idx="minor">
+            <a:schemeClr val="tx1"/>
+          </a:fontRef>
+        </p:style>
+      </p:cxnSp>
+      <p:cxnSp>
+        <p:nvCxnSpPr>
+          <p:cNvPr id="93" name="Conector angular 92"/>
+          <p:cNvCxnSpPr>
+            <a:stCxn id="4" idx="2"/>
+            <a:endCxn id="274" idx="0"/>
+          </p:cNvCxnSpPr>
+          <p:nvPr/>
+        </p:nvCxnSpPr>
+        <p:spPr>
+          <a:xfrm rot="5400000">
+            <a:off x="4618733" y="560692"/>
+            <a:ext cx="262421" cy="3308"/>
+          </a:xfrm>
+          <a:prstGeom prst="bentConnector3">
+            <a:avLst>
+              <a:gd name="adj1" fmla="val 50000"/>
+            </a:avLst>
+          </a:prstGeom>
+          <a:ln w="12700">
+            <a:solidFill>
+              <a:schemeClr val="tx1"/>
+            </a:solidFill>
+          </a:ln>
+        </p:spPr>
+        <p:style>
+          <a:lnRef idx="1">
+            <a:schemeClr val="accent1"/>
+          </a:lnRef>
+          <a:fillRef idx="0">
+            <a:schemeClr val="accent1"/>
+          </a:fillRef>
+          <a:effectRef idx="0">
+            <a:schemeClr val="accent1"/>
+          </a:effectRef>
+          <a:fontRef idx="minor">
+            <a:schemeClr val="tx1"/>
+          </a:fontRef>
+        </p:style>
+      </p:cxnSp>
+      <p:cxnSp>
+        <p:nvCxnSpPr>
+          <p:cNvPr id="145" name="Conector angular 144"/>
+          <p:cNvCxnSpPr>
+            <a:stCxn id="175" idx="2"/>
+            <a:endCxn id="460" idx="0"/>
+          </p:cNvCxnSpPr>
+          <p:nvPr/>
+        </p:nvCxnSpPr>
+        <p:spPr>
+          <a:xfrm rot="16200000" flipH="1">
+            <a:off x="6143130" y="4821282"/>
+            <a:ext cx="817440" cy="763091"/>
+          </a:xfrm>
+          <a:prstGeom prst="bentConnector3">
+            <a:avLst>
+              <a:gd name="adj1" fmla="val 50000"/>
+            </a:avLst>
+          </a:prstGeom>
+        </p:spPr>
+        <p:style>
+          <a:lnRef idx="1">
+            <a:schemeClr val="dk1"/>
+          </a:lnRef>
+          <a:fillRef idx="0">
+            <a:schemeClr val="dk1"/>
+          </a:fillRef>
+          <a:effectRef idx="0">
+            <a:schemeClr val="dk1"/>
+          </a:effectRef>
+          <a:fontRef idx="minor">
+            <a:schemeClr val="tx1"/>
+          </a:fontRef>
+        </p:style>
+      </p:cxnSp>
+      <p:cxnSp>
+        <p:nvCxnSpPr>
+          <p:cNvPr id="149" name="Conector angular 148"/>
+          <p:cNvCxnSpPr>
+            <a:stCxn id="19" idx="2"/>
+            <a:endCxn id="44" idx="0"/>
+          </p:cNvCxnSpPr>
+          <p:nvPr/>
+        </p:nvCxnSpPr>
+        <p:spPr>
+          <a:xfrm rot="5400000">
+            <a:off x="1057224" y="1930058"/>
+            <a:ext cx="370155" cy="982766"/>
+          </a:xfrm>
+          <a:prstGeom prst="bentConnector3">
+            <a:avLst>
+              <a:gd name="adj1" fmla="val 50000"/>
+            </a:avLst>
+          </a:prstGeom>
+        </p:spPr>
+        <p:style>
+          <a:lnRef idx="1">
+            <a:schemeClr val="dk1"/>
+          </a:lnRef>
+          <a:fillRef idx="0">
+            <a:schemeClr val="dk1"/>
+          </a:fillRef>
+          <a:effectRef idx="0">
+            <a:schemeClr val="dk1"/>
+          </a:effectRef>
+          <a:fontRef idx="minor">
+            <a:schemeClr val="tx1"/>
+          </a:fontRef>
+        </p:style>
+      </p:cxnSp>
+      <p:cxnSp>
+        <p:nvCxnSpPr>
+          <p:cNvPr id="155" name="Conector angular 154"/>
+          <p:cNvCxnSpPr>
+            <a:stCxn id="19" idx="2"/>
+            <a:endCxn id="88" idx="0"/>
+          </p:cNvCxnSpPr>
+          <p:nvPr/>
+        </p:nvCxnSpPr>
+        <p:spPr>
+          <a:xfrm rot="16200000" flipH="1">
+            <a:off x="1993046" y="1977002"/>
+            <a:ext cx="383780" cy="902504"/>
+          </a:xfrm>
+          <a:prstGeom prst="bentConnector3">
+            <a:avLst>
+              <a:gd name="adj1" fmla="val 50000"/>
+            </a:avLst>
+          </a:prstGeom>
+        </p:spPr>
+        <p:style>
+          <a:lnRef idx="1">
+            <a:schemeClr val="dk1"/>
+          </a:lnRef>
+          <a:fillRef idx="0">
+            <a:schemeClr val="dk1"/>
+          </a:fillRef>
+          <a:effectRef idx="0">
+            <a:schemeClr val="dk1"/>
+          </a:effectRef>
+          <a:fontRef idx="minor">
+            <a:schemeClr val="tx1"/>
+          </a:fontRef>
+        </p:style>
+      </p:cxnSp>
+      <p:cxnSp>
+        <p:nvCxnSpPr>
+          <p:cNvPr id="158" name="Conector angular 157"/>
+          <p:cNvCxnSpPr>
+            <a:stCxn id="19" idx="2"/>
+            <a:endCxn id="135" idx="0"/>
+          </p:cNvCxnSpPr>
+          <p:nvPr/>
+        </p:nvCxnSpPr>
+        <p:spPr>
+          <a:xfrm rot="5400000">
+            <a:off x="1540062" y="2416118"/>
+            <a:ext cx="373376" cy="13869"/>
+          </a:xfrm>
+          <a:prstGeom prst="bentConnector3">
+            <a:avLst>
+              <a:gd name="adj1" fmla="val 50000"/>
+            </a:avLst>
+          </a:prstGeom>
+        </p:spPr>
+        <p:style>
+          <a:lnRef idx="1">
+            <a:schemeClr val="dk1"/>
+          </a:lnRef>
+          <a:fillRef idx="0">
+            <a:schemeClr val="dk1"/>
+          </a:fillRef>
+          <a:effectRef idx="0">
+            <a:schemeClr val="dk1"/>
+          </a:effectRef>
+          <a:fontRef idx="minor">
+            <a:schemeClr val="tx1"/>
+          </a:fontRef>
+        </p:style>
+      </p:cxnSp>
+      <p:cxnSp>
+        <p:nvCxnSpPr>
+          <p:cNvPr id="178" name="Conector angular 177"/>
+          <p:cNvCxnSpPr>
+            <a:stCxn id="172" idx="2"/>
+            <a:endCxn id="164" idx="0"/>
+          </p:cNvCxnSpPr>
+          <p:nvPr/>
+        </p:nvCxnSpPr>
+        <p:spPr>
+          <a:xfrm rot="5400000">
+            <a:off x="3934785" y="3808770"/>
+            <a:ext cx="380240" cy="700022"/>
+          </a:xfrm>
+          <a:prstGeom prst="bentConnector3">
+            <a:avLst>
+              <a:gd name="adj1" fmla="val 50000"/>
+            </a:avLst>
+          </a:prstGeom>
+        </p:spPr>
+        <p:style>
+          <a:lnRef idx="1">
+            <a:schemeClr val="dk1"/>
+          </a:lnRef>
+          <a:fillRef idx="0">
+            <a:schemeClr val="dk1"/>
+          </a:fillRef>
+          <a:effectRef idx="0">
+            <a:schemeClr val="dk1"/>
+          </a:effectRef>
+          <a:fontRef idx="minor">
+            <a:schemeClr val="tx1"/>
+          </a:fontRef>
+        </p:style>
+      </p:cxnSp>
+      <p:cxnSp>
+        <p:nvCxnSpPr>
+          <p:cNvPr id="181" name="Conector angular 180"/>
+          <p:cNvCxnSpPr>
+            <a:stCxn id="172" idx="2"/>
+            <a:endCxn id="162" idx="0"/>
+          </p:cNvCxnSpPr>
+          <p:nvPr/>
+        </p:nvCxnSpPr>
+        <p:spPr>
+          <a:xfrm rot="16200000" flipH="1">
+            <a:off x="4576254" y="3867323"/>
+            <a:ext cx="383277" cy="585952"/>
+          </a:xfrm>
+          <a:prstGeom prst="bentConnector3">
+            <a:avLst>
+              <a:gd name="adj1" fmla="val 50000"/>
+            </a:avLst>
+          </a:prstGeom>
+        </p:spPr>
+        <p:style>
+          <a:lnRef idx="1">
+            <a:schemeClr val="dk1"/>
+          </a:lnRef>
+          <a:fillRef idx="0">
+            <a:schemeClr val="dk1"/>
+          </a:fillRef>
+          <a:effectRef idx="0">
+            <a:schemeClr val="dk1"/>
+          </a:effectRef>
+          <a:fontRef idx="minor">
+            <a:schemeClr val="tx1"/>
+          </a:fontRef>
+        </p:style>
+      </p:cxnSp>
+      <p:cxnSp>
+        <p:nvCxnSpPr>
+          <p:cNvPr id="217" name="Conector angular 216"/>
+          <p:cNvCxnSpPr>
+            <a:stCxn id="175" idx="2"/>
+            <a:endCxn id="461" idx="0"/>
+          </p:cNvCxnSpPr>
+          <p:nvPr/>
+        </p:nvCxnSpPr>
+        <p:spPr>
+          <a:xfrm rot="5400000">
+            <a:off x="5408443" y="5552346"/>
+            <a:ext cx="1520100" cy="3625"/>
+          </a:xfrm>
+          <a:prstGeom prst="bentConnector3">
+            <a:avLst>
+              <a:gd name="adj1" fmla="val 50000"/>
+            </a:avLst>
           </a:prstGeom>
         </p:spPr>
         <p:style>

</xml_diff>